<commit_message>
Adaugat un punct nou de facut
</commit_message>
<xml_diff>
--- a/Doc/Prezicere pret actiuni.pptx
+++ b/Doc/Prezicere pret actiuni.pptx
@@ -9,6 +9,7 @@
     <p:sldId id="257" r:id="rId3"/>
     <p:sldId id="258" r:id="rId4"/>
     <p:sldId id="259" r:id="rId5"/>
+    <p:sldId id="260" r:id="rId6"/>
   </p:sldIdLst>
   <p:sldSz cx="12192000" cy="6858000"/>
   <p:notesSz cx="6858000" cy="9144000"/>
@@ -107,6 +108,11 @@
       </a:defRPr>
     </a:lvl9pPr>
   </p:defaultTextStyle>
+  <p:extLst>
+    <p:ext uri="{EFAFB233-063F-42B5-8137-9DF3F51BA10A}">
+      <p15:sldGuideLst xmlns:p15="http://schemas.microsoft.com/office/powerpoint/2012/main"/>
+    </p:ext>
+  </p:extLst>
 </p:presentation>
 </file>
 
@@ -259,7 +265,7 @@
           <a:p>
             <a:fld id="{D26A27A1-E3F0-46DF-91D7-3DE2967E6C8E}" type="datetimeFigureOut">
               <a:rPr lang="de-DE" smtClean="0"/>
-              <a:t>24.04.2025</a:t>
+              <a:t>27.04.2025</a:t>
             </a:fld>
             <a:endParaRPr lang="de-DE"/>
           </a:p>
@@ -459,7 +465,7 @@
           <a:p>
             <a:fld id="{D26A27A1-E3F0-46DF-91D7-3DE2967E6C8E}" type="datetimeFigureOut">
               <a:rPr lang="de-DE" smtClean="0"/>
-              <a:t>24.04.2025</a:t>
+              <a:t>27.04.2025</a:t>
             </a:fld>
             <a:endParaRPr lang="de-DE"/>
           </a:p>
@@ -669,7 +675,7 @@
           <a:p>
             <a:fld id="{D26A27A1-E3F0-46DF-91D7-3DE2967E6C8E}" type="datetimeFigureOut">
               <a:rPr lang="de-DE" smtClean="0"/>
-              <a:t>24.04.2025</a:t>
+              <a:t>27.04.2025</a:t>
             </a:fld>
             <a:endParaRPr lang="de-DE"/>
           </a:p>
@@ -869,7 +875,7 @@
           <a:p>
             <a:fld id="{D26A27A1-E3F0-46DF-91D7-3DE2967E6C8E}" type="datetimeFigureOut">
               <a:rPr lang="de-DE" smtClean="0"/>
-              <a:t>24.04.2025</a:t>
+              <a:t>27.04.2025</a:t>
             </a:fld>
             <a:endParaRPr lang="de-DE"/>
           </a:p>
@@ -1145,7 +1151,7 @@
           <a:p>
             <a:fld id="{D26A27A1-E3F0-46DF-91D7-3DE2967E6C8E}" type="datetimeFigureOut">
               <a:rPr lang="de-DE" smtClean="0"/>
-              <a:t>24.04.2025</a:t>
+              <a:t>27.04.2025</a:t>
             </a:fld>
             <a:endParaRPr lang="de-DE"/>
           </a:p>
@@ -1413,7 +1419,7 @@
           <a:p>
             <a:fld id="{D26A27A1-E3F0-46DF-91D7-3DE2967E6C8E}" type="datetimeFigureOut">
               <a:rPr lang="de-DE" smtClean="0"/>
-              <a:t>24.04.2025</a:t>
+              <a:t>27.04.2025</a:t>
             </a:fld>
             <a:endParaRPr lang="de-DE"/>
           </a:p>
@@ -1828,7 +1834,7 @@
           <a:p>
             <a:fld id="{D26A27A1-E3F0-46DF-91D7-3DE2967E6C8E}" type="datetimeFigureOut">
               <a:rPr lang="de-DE" smtClean="0"/>
-              <a:t>24.04.2025</a:t>
+              <a:t>27.04.2025</a:t>
             </a:fld>
             <a:endParaRPr lang="de-DE"/>
           </a:p>
@@ -1970,7 +1976,7 @@
           <a:p>
             <a:fld id="{D26A27A1-E3F0-46DF-91D7-3DE2967E6C8E}" type="datetimeFigureOut">
               <a:rPr lang="de-DE" smtClean="0"/>
-              <a:t>24.04.2025</a:t>
+              <a:t>27.04.2025</a:t>
             </a:fld>
             <a:endParaRPr lang="de-DE"/>
           </a:p>
@@ -2083,7 +2089,7 @@
           <a:p>
             <a:fld id="{D26A27A1-E3F0-46DF-91D7-3DE2967E6C8E}" type="datetimeFigureOut">
               <a:rPr lang="de-DE" smtClean="0"/>
-              <a:t>24.04.2025</a:t>
+              <a:t>27.04.2025</a:t>
             </a:fld>
             <a:endParaRPr lang="de-DE"/>
           </a:p>
@@ -2396,7 +2402,7 @@
           <a:p>
             <a:fld id="{D26A27A1-E3F0-46DF-91D7-3DE2967E6C8E}" type="datetimeFigureOut">
               <a:rPr lang="de-DE" smtClean="0"/>
-              <a:t>24.04.2025</a:t>
+              <a:t>27.04.2025</a:t>
             </a:fld>
             <a:endParaRPr lang="de-DE"/>
           </a:p>
@@ -2685,7 +2691,7 @@
           <a:p>
             <a:fld id="{D26A27A1-E3F0-46DF-91D7-3DE2967E6C8E}" type="datetimeFigureOut">
               <a:rPr lang="de-DE" smtClean="0"/>
-              <a:t>24.04.2025</a:t>
+              <a:t>27.04.2025</a:t>
             </a:fld>
             <a:endParaRPr lang="de-DE"/>
           </a:p>
@@ -2928,7 +2934,7 @@
           <a:p>
             <a:fld id="{D26A27A1-E3F0-46DF-91D7-3DE2967E6C8E}" type="datetimeFigureOut">
               <a:rPr lang="de-DE" smtClean="0"/>
-              <a:t>24.04.2025</a:t>
+              <a:t>27.04.2025</a:t>
             </a:fld>
             <a:endParaRPr lang="de-DE"/>
           </a:p>
@@ -4459,6 +4465,226 @@
     <p:extLst>
       <p:ext uri="{BB962C8B-B14F-4D97-AF65-F5344CB8AC3E}">
         <p14:creationId xmlns:p14="http://schemas.microsoft.com/office/powerpoint/2010/main" val="1331612692"/>
+      </p:ext>
+    </p:extLst>
+  </p:cSld>
+  <p:clrMapOvr>
+    <a:masterClrMapping/>
+  </p:clrMapOvr>
+</p:sld>
+</file>
+
+<file path=ppt/slides/slide5.xml><?xml version="1.0" encoding="utf-8"?>
+<p:sld xmlns:a="http://schemas.openxmlformats.org/drawingml/2006/main" xmlns:r="http://schemas.openxmlformats.org/officeDocument/2006/relationships" xmlns:p="http://schemas.openxmlformats.org/presentationml/2006/main">
+  <p:cSld>
+    <p:spTree>
+      <p:nvGrpSpPr>
+        <p:cNvPr id="1" name=""/>
+        <p:cNvGrpSpPr/>
+        <p:nvPr/>
+      </p:nvGrpSpPr>
+      <p:grpSpPr>
+        <a:xfrm>
+          <a:off x="0" y="0"/>
+          <a:ext cx="0" cy="0"/>
+          <a:chOff x="0" y="0"/>
+          <a:chExt cx="0" cy="0"/>
+        </a:xfrm>
+      </p:grpSpPr>
+      <p:sp>
+        <p:nvSpPr>
+          <p:cNvPr id="2" name="Title 1">
+            <a:extLst>
+              <a:ext uri="{FF2B5EF4-FFF2-40B4-BE49-F238E27FC236}">
+                <a16:creationId xmlns:a16="http://schemas.microsoft.com/office/drawing/2014/main" id="{68CD8C2C-30D3-2A0D-F988-86879D876180}"/>
+              </a:ext>
+            </a:extLst>
+          </p:cNvPr>
+          <p:cNvSpPr>
+            <a:spLocks noGrp="1"/>
+          </p:cNvSpPr>
+          <p:nvPr>
+            <p:ph type="title"/>
+          </p:nvPr>
+        </p:nvSpPr>
+        <p:spPr/>
+        <p:txBody>
+          <a:bodyPr/>
+          <a:lstStyle/>
+          <a:p>
+            <a:r>
+              <a:rPr lang="en-GB" dirty="0" err="1"/>
+              <a:t>Scalarea</a:t>
+            </a:r>
+            <a:r>
+              <a:rPr lang="en-GB" dirty="0"/>
+              <a:t> </a:t>
+            </a:r>
+            <a:r>
+              <a:rPr lang="en-GB" dirty="0" err="1"/>
+              <a:t>datelor</a:t>
+            </a:r>
+            <a:r>
+              <a:rPr lang="en-GB" dirty="0"/>
+              <a:t> de </a:t>
+            </a:r>
+            <a:r>
+              <a:rPr lang="en-GB" dirty="0" err="1"/>
+              <a:t>intrare</a:t>
+            </a:r>
+            <a:r>
+              <a:rPr lang="en-GB" dirty="0"/>
+              <a:t>	</a:t>
+            </a:r>
+            <a:endParaRPr lang="de-DE" dirty="0"/>
+          </a:p>
+        </p:txBody>
+      </p:sp>
+      <p:sp>
+        <p:nvSpPr>
+          <p:cNvPr id="3" name="Content Placeholder 2">
+            <a:extLst>
+              <a:ext uri="{FF2B5EF4-FFF2-40B4-BE49-F238E27FC236}">
+                <a16:creationId xmlns:a16="http://schemas.microsoft.com/office/drawing/2014/main" id="{258FA0F8-497F-E349-B43B-A591F6A942A2}"/>
+              </a:ext>
+            </a:extLst>
+          </p:cNvPr>
+          <p:cNvSpPr>
+            <a:spLocks noGrp="1"/>
+          </p:cNvSpPr>
+          <p:nvPr>
+            <p:ph idx="1"/>
+          </p:nvPr>
+        </p:nvSpPr>
+        <p:spPr/>
+        <p:txBody>
+          <a:bodyPr/>
+          <a:lstStyle/>
+          <a:p>
+            <a:r>
+              <a:rPr lang="en-GB" dirty="0"/>
+              <a:t>LSTM merge cu Valori </a:t>
+            </a:r>
+            <a:r>
+              <a:rPr lang="en-GB" dirty="0" err="1"/>
+              <a:t>intre</a:t>
+            </a:r>
+            <a:r>
+              <a:rPr lang="en-GB" dirty="0"/>
+              <a:t> -1..1. </a:t>
+            </a:r>
+            <a:r>
+              <a:rPr lang="en-GB" dirty="0" err="1"/>
+              <a:t>Vom</a:t>
+            </a:r>
+            <a:r>
+              <a:rPr lang="en-GB" dirty="0"/>
+              <a:t> </a:t>
+            </a:r>
+            <a:r>
+              <a:rPr lang="en-GB" dirty="0" err="1"/>
+              <a:t>folosi</a:t>
+            </a:r>
+            <a:r>
+              <a:rPr lang="en-GB" dirty="0"/>
+              <a:t> o </a:t>
+            </a:r>
+            <a:r>
+              <a:rPr lang="en-GB" dirty="0" err="1"/>
+              <a:t>functie</a:t>
+            </a:r>
+            <a:r>
+              <a:rPr lang="en-GB" dirty="0"/>
+              <a:t> de </a:t>
+            </a:r>
+            <a:r>
+              <a:rPr lang="en-GB" dirty="0" err="1"/>
+              <a:t>scalare</a:t>
+            </a:r>
+            <a:r>
+              <a:rPr lang="en-GB" dirty="0"/>
+              <a:t> a </a:t>
+            </a:r>
+            <a:r>
+              <a:rPr lang="en-GB" dirty="0" err="1"/>
+              <a:t>datelor</a:t>
+            </a:r>
+            <a:endParaRPr lang="en-GB" dirty="0"/>
+          </a:p>
+          <a:p>
+            <a:r>
+              <a:rPr lang="en-GB" dirty="0" err="1"/>
+              <a:t>Pentru</a:t>
+            </a:r>
+            <a:r>
+              <a:rPr lang="en-GB" dirty="0"/>
+              <a:t> </a:t>
+            </a:r>
+            <a:r>
+              <a:rPr lang="en-GB" dirty="0" err="1"/>
+              <a:t>prezicere</a:t>
+            </a:r>
+            <a:r>
+              <a:rPr lang="en-GB" dirty="0"/>
+              <a:t> de </a:t>
+            </a:r>
+            <a:r>
+              <a:rPr lang="en-GB" dirty="0" err="1"/>
+              <a:t>pret</a:t>
+            </a:r>
+            <a:r>
+              <a:rPr lang="en-GB" dirty="0"/>
+              <a:t> de </a:t>
+            </a:r>
+            <a:r>
+              <a:rPr lang="en-GB" dirty="0" err="1"/>
+              <a:t>actiuni</a:t>
+            </a:r>
+            <a:r>
+              <a:rPr lang="en-GB" dirty="0"/>
+              <a:t> </a:t>
+            </a:r>
+            <a:r>
+              <a:rPr lang="en-GB" dirty="0" err="1"/>
+              <a:t>scalarea</a:t>
+            </a:r>
+            <a:r>
+              <a:rPr lang="en-GB" dirty="0"/>
+              <a:t> </a:t>
+            </a:r>
+            <a:r>
+              <a:rPr lang="en-GB" dirty="0" err="1"/>
+              <a:t>datelor</a:t>
+            </a:r>
+            <a:r>
+              <a:rPr lang="en-GB" dirty="0"/>
+              <a:t> </a:t>
+            </a:r>
+            <a:r>
+              <a:rPr lang="en-GB" dirty="0" err="1"/>
+              <a:t>folosim</a:t>
+            </a:r>
+            <a:r>
+              <a:rPr lang="en-GB" dirty="0"/>
+              <a:t> logarithm</a:t>
+            </a:r>
+          </a:p>
+          <a:p>
+            <a:endParaRPr lang="en-GB" dirty="0"/>
+          </a:p>
+          <a:p>
+            <a:r>
+              <a:rPr lang="en-GB"/>
+              <a:t>Batch normalisation</a:t>
+            </a:r>
+            <a:endParaRPr lang="de-DE"/>
+          </a:p>
+        </p:txBody>
+      </p:sp>
+    </p:spTree>
+    <p:extLst>
+      <p:ext uri="{BB962C8B-B14F-4D97-AF65-F5344CB8AC3E}">
+        <p14:creationId xmlns:p14="http://schemas.microsoft.com/office/powerpoint/2010/main" val="2754598453"/>
       </p:ext>
     </p:extLst>
   </p:cSld>

</xml_diff>